<commit_message>
Fixing LSTM vs ARIMA plot
</commit_message>
<xml_diff>
--- a/Deliverables/Presentation/Writing_Project_Poster.pptx
+++ b/Deliverables/Presentation/Writing_Project_Poster.pptx
@@ -5871,14 +5871,14 @@
           </a:ln>
           <a:extLst>
             <a:ext uri="{909E8E84-426E-40dd-AFC4-6F175D3DCCD1}">
-              <a14:hiddenFill xmlns:a14="http://schemas.microsoft.com/office/drawing/2010/main" xmlns="">
+              <a14:hiddenFill xmlns="" xmlns:a14="http://schemas.microsoft.com/office/drawing/2010/main">
                 <a:solidFill>
                   <a:srgbClr val="FFFFFF"/>
                 </a:solidFill>
               </a14:hiddenFill>
             </a:ext>
             <a:ext uri="{91240B29-F687-4f45-9708-019B960494DF}">
-              <a14:hiddenLine xmlns:a14="http://schemas.microsoft.com/office/drawing/2010/main" xmlns="" w="9525">
+              <a14:hiddenLine xmlns="" xmlns:a14="http://schemas.microsoft.com/office/drawing/2010/main" w="9525">
                 <a:solidFill>
                   <a:srgbClr val="000000"/>
                 </a:solidFill>
@@ -6678,14 +6678,14 @@
           </a:ln>
           <a:extLst>
             <a:ext uri="{909E8E84-426E-40dd-AFC4-6F175D3DCCD1}">
-              <a14:hiddenFill xmlns:a14="http://schemas.microsoft.com/office/drawing/2010/main" xmlns="">
+              <a14:hiddenFill xmlns="" xmlns:a14="http://schemas.microsoft.com/office/drawing/2010/main">
                 <a:solidFill>
                   <a:srgbClr val="FFFFFF"/>
                 </a:solidFill>
               </a14:hiddenFill>
             </a:ext>
             <a:ext uri="{91240B29-F687-4f45-9708-019B960494DF}">
-              <a14:hiddenLine xmlns:a14="http://schemas.microsoft.com/office/drawing/2010/main" xmlns="" w="9525">
+              <a14:hiddenLine xmlns="" xmlns:a14="http://schemas.microsoft.com/office/drawing/2010/main" w="9525">
                 <a:solidFill>
                   <a:srgbClr val="000000"/>
                 </a:solidFill>
@@ -10735,14 +10735,14 @@
           </a:ln>
           <a:extLst>
             <a:ext uri="{909E8E84-426E-40dd-AFC4-6F175D3DCCD1}">
-              <a14:hiddenFill xmlns:a14="http://schemas.microsoft.com/office/drawing/2010/main" xmlns="">
+              <a14:hiddenFill xmlns="" xmlns:a14="http://schemas.microsoft.com/office/drawing/2010/main">
                 <a:solidFill>
                   <a:srgbClr val="FFFFFF"/>
                 </a:solidFill>
               </a14:hiddenFill>
             </a:ext>
             <a:ext uri="{91240B29-F687-4f45-9708-019B960494DF}">
-              <a14:hiddenLine xmlns:a14="http://schemas.microsoft.com/office/drawing/2010/main" xmlns="" w="9525">
+              <a14:hiddenLine xmlns="" xmlns:a14="http://schemas.microsoft.com/office/drawing/2010/main" w="9525">
                 <a:solidFill>
                   <a:srgbClr val="000000"/>
                 </a:solidFill>
@@ -12656,14 +12656,14 @@
           </a:ln>
           <a:extLst>
             <a:ext uri="{909E8E84-426E-40dd-AFC4-6F175D3DCCD1}">
-              <a14:hiddenFill xmlns:a14="http://schemas.microsoft.com/office/drawing/2010/main" xmlns="">
+              <a14:hiddenFill xmlns="" xmlns:a14="http://schemas.microsoft.com/office/drawing/2010/main">
                 <a:solidFill>
                   <a:srgbClr val="FFFFFF"/>
                 </a:solidFill>
               </a14:hiddenFill>
             </a:ext>
             <a:ext uri="{91240B29-F687-4f45-9708-019B960494DF}">
-              <a14:hiddenLine xmlns:a14="http://schemas.microsoft.com/office/drawing/2010/main" xmlns="" w="9525">
+              <a14:hiddenLine xmlns="" xmlns:a14="http://schemas.microsoft.com/office/drawing/2010/main" w="9525">
                 <a:solidFill>
                   <a:srgbClr val="000000"/>
                 </a:solidFill>
@@ -13236,7 +13236,7 @@
       </p:sp>
       <p:pic>
         <p:nvPicPr>
-          <p:cNvPr id="46" name="Picture 45" descr="A graph with a line and a line&#10;&#10;Description automatically generated with medium confidence">
+          <p:cNvPr id="46" name="Picture 45">
             <a:extLst>
               <a:ext uri="{FF2B5EF4-FFF2-40B4-BE49-F238E27FC236}">
                 <a16:creationId xmlns:a16="http://schemas.microsoft.com/office/drawing/2014/main" id="{D1D73D4D-7A5C-2B06-5063-2152D48331A7}"/>
@@ -13248,7 +13248,7 @@
           </p:cNvPicPr>
           <p:nvPr/>
         </p:nvPicPr>
-        <p:blipFill rotWithShape="1">
+        <p:blipFill>
           <a:blip r:embed="rId7">
             <a:extLst>
               <a:ext uri="{28A0092B-C50C-407E-A947-70E740481C1C}">
@@ -13256,7 +13256,7 @@
               </a:ext>
             </a:extLst>
           </a:blip>
-          <a:srcRect l="6200" t="3193" r="7522" b="4485"/>
+          <a:srcRect l="3273" r="3273"/>
           <a:stretch/>
         </p:blipFill>
         <p:spPr>
@@ -14562,6 +14562,26 @@
 </file>
 
 <file path=customXml/item1.xml><?xml version="1.0" encoding="utf-8"?>
+<p:properties xmlns:p="http://schemas.microsoft.com/office/2006/metadata/properties" xmlns:xsi="http://www.w3.org/2001/XMLSchema-instance" xmlns:pc="http://schemas.microsoft.com/office/infopath/2007/PartnerControls">
+  <documentManagement>
+    <lcf76f155ced4ddcb4097134ff3c332f xmlns="d0d0097c-64f4-4e3b-99a3-bc1c796771ba">
+      <Terms xmlns="http://schemas.microsoft.com/office/infopath/2007/PartnerControls"/>
+    </lcf76f155ced4ddcb4097134ff3c332f>
+    <TaxCatchAll xmlns="a7e95da2-8946-49ae-a42c-eac0e2e49090" xsi:nil="true"/>
+  </documentManagement>
+</p:properties>
+</file>
+
+<file path=customXml/item2.xml><?xml version="1.0" encoding="utf-8"?>
+<?mso-contentType ?>
+<FormTemplates xmlns="http://schemas.microsoft.com/sharepoint/v3/contenttype/forms">
+  <Display>DocumentLibraryForm</Display>
+  <Edit>DocumentLibraryForm</Edit>
+  <New>DocumentLibraryForm</New>
+</FormTemplates>
+</file>
+
+<file path=customXml/item3.xml><?xml version="1.0" encoding="utf-8"?>
 <ct:contentTypeSchema xmlns:ct="http://schemas.microsoft.com/office/2006/metadata/contentType" xmlns:ma="http://schemas.microsoft.com/office/2006/metadata/properties/metaAttributes" ct:_="" ma:_="" ma:contentTypeName="Document" ma:contentTypeID="0x010100DC58E895C404BE40B8E18D2FE0DE171E" ma:contentTypeVersion="15" ma:contentTypeDescription="Create a new document." ma:contentTypeScope="" ma:versionID="e3b50e3d3966c5dce05a9c59b7961e98">
   <xsd:schema xmlns:xsd="http://www.w3.org/2001/XMLSchema" xmlns:xs="http://www.w3.org/2001/XMLSchema" xmlns:p="http://schemas.microsoft.com/office/2006/metadata/properties" xmlns:ns2="d0d0097c-64f4-4e3b-99a3-bc1c796771ba" xmlns:ns3="a7e95da2-8946-49ae-a42c-eac0e2e49090" targetNamespace="http://schemas.microsoft.com/office/2006/metadata/properties" ma:root="true" ma:fieldsID="846743cf0710f7e7c5b0659fc053b820" ns2:_="" ns3:_="">
     <xsd:import namespace="d0d0097c-64f4-4e3b-99a3-bc1c796771ba"/>
@@ -14792,27 +14812,26 @@
 </ct:contentTypeSchema>
 </file>
 
-<file path=customXml/item2.xml><?xml version="1.0" encoding="utf-8"?>
-<?mso-contentType ?>
-<FormTemplates xmlns="http://schemas.microsoft.com/sharepoint/v3/contenttype/forms">
-  <Display>DocumentLibraryForm</Display>
-  <Edit>DocumentLibraryForm</Edit>
-  <New>DocumentLibraryForm</New>
-</FormTemplates>
+<file path=customXml/itemProps1.xml><?xml version="1.0" encoding="utf-8"?>
+<ds:datastoreItem xmlns:ds="http://schemas.openxmlformats.org/officeDocument/2006/customXml" ds:itemID="{043E23B3-DF4A-4430-99EE-26D50DF888E5}">
+  <ds:schemaRefs>
+    <ds:schemaRef ds:uri="http://schemas.microsoft.com/office/2006/metadata/properties"/>
+    <ds:schemaRef ds:uri="http://schemas.microsoft.com/office/infopath/2007/PartnerControls"/>
+    <ds:schemaRef ds:uri="d0d0097c-64f4-4e3b-99a3-bc1c796771ba"/>
+    <ds:schemaRef ds:uri="a7e95da2-8946-49ae-a42c-eac0e2e49090"/>
+  </ds:schemaRefs>
+</ds:datastoreItem>
 </file>
 
-<file path=customXml/item3.xml><?xml version="1.0" encoding="utf-8"?>
-<p:properties xmlns:p="http://schemas.microsoft.com/office/2006/metadata/properties" xmlns:xsi="http://www.w3.org/2001/XMLSchema-instance" xmlns:pc="http://schemas.microsoft.com/office/infopath/2007/PartnerControls">
-  <documentManagement>
-    <lcf76f155ced4ddcb4097134ff3c332f xmlns="d0d0097c-64f4-4e3b-99a3-bc1c796771ba">
-      <Terms xmlns="http://schemas.microsoft.com/office/infopath/2007/PartnerControls"/>
-    </lcf76f155ced4ddcb4097134ff3c332f>
-    <TaxCatchAll xmlns="a7e95da2-8946-49ae-a42c-eac0e2e49090" xsi:nil="true"/>
-  </documentManagement>
-</p:properties>
+<file path=customXml/itemProps2.xml><?xml version="1.0" encoding="utf-8"?>
+<ds:datastoreItem xmlns:ds="http://schemas.openxmlformats.org/officeDocument/2006/customXml" ds:itemID="{E7CBD2F7-3565-4EC3-A19A-418CF48FD40C}">
+  <ds:schemaRefs>
+    <ds:schemaRef ds:uri="http://schemas.microsoft.com/sharepoint/v3/contenttype/forms"/>
+  </ds:schemaRefs>
+</ds:datastoreItem>
 </file>
 
-<file path=customXml/itemProps1.xml><?xml version="1.0" encoding="utf-8"?>
+<file path=customXml/itemProps3.xml><?xml version="1.0" encoding="utf-8"?>
 <ds:datastoreItem xmlns:ds="http://schemas.openxmlformats.org/officeDocument/2006/customXml" ds:itemID="{E8B4DDAE-604A-4778-BDB0-C834633F1A3E}">
   <ds:schemaRefs>
     <ds:schemaRef ds:uri="http://schemas.microsoft.com/office/2006/metadata/contentType"/>
@@ -14829,23 +14848,4 @@
     <ds:schemaRef ds:uri="http://schemas.microsoft.com/internal/obd"/>
   </ds:schemaRefs>
 </ds:datastoreItem>
-</file>
-
-<file path=customXml/itemProps2.xml><?xml version="1.0" encoding="utf-8"?>
-<ds:datastoreItem xmlns:ds="http://schemas.openxmlformats.org/officeDocument/2006/customXml" ds:itemID="{E7CBD2F7-3565-4EC3-A19A-418CF48FD40C}">
-  <ds:schemaRefs>
-    <ds:schemaRef ds:uri="http://schemas.microsoft.com/sharepoint/v3/contenttype/forms"/>
-  </ds:schemaRefs>
-</ds:datastoreItem>
-</file>
-
-<file path=customXml/itemProps3.xml><?xml version="1.0" encoding="utf-8"?>
-<ds:datastoreItem xmlns:ds="http://schemas.openxmlformats.org/officeDocument/2006/customXml" ds:itemID="{043E23B3-DF4A-4430-99EE-26D50DF888E5}">
-  <ds:schemaRefs>
-    <ds:schemaRef ds:uri="http://schemas.microsoft.com/office/2006/metadata/properties"/>
-    <ds:schemaRef ds:uri="http://schemas.microsoft.com/office/infopath/2007/PartnerControls"/>
-    <ds:schemaRef ds:uri="d0d0097c-64f4-4e3b-99a3-bc1c796771ba"/>
-    <ds:schemaRef ds:uri="a7e95da2-8946-49ae-a42c-eac0e2e49090"/>
-  </ds:schemaRefs>
-</ds:datastoreItem>
 </file>
</xml_diff>

<commit_message>
Updating repo w/ intial writing & updated code
</commit_message>
<xml_diff>
--- a/Deliverables/Presentation/Writing_Project_Poster.pptx
+++ b/Deliverables/Presentation/Writing_Project_Poster.pptx
@@ -5871,14 +5871,14 @@
           </a:ln>
           <a:extLst>
             <a:ext uri="{909E8E84-426E-40dd-AFC4-6F175D3DCCD1}">
-              <a14:hiddenFill xmlns:a14="http://schemas.microsoft.com/office/drawing/2010/main" xmlns="">
+              <a14:hiddenFill xmlns="" xmlns:a14="http://schemas.microsoft.com/office/drawing/2010/main">
                 <a:solidFill>
                   <a:srgbClr val="FFFFFF"/>
                 </a:solidFill>
               </a14:hiddenFill>
             </a:ext>
             <a:ext uri="{91240B29-F687-4f45-9708-019B960494DF}">
-              <a14:hiddenLine xmlns:a14="http://schemas.microsoft.com/office/drawing/2010/main" xmlns="" w="9525">
+              <a14:hiddenLine xmlns="" xmlns:a14="http://schemas.microsoft.com/office/drawing/2010/main" w="9525">
                 <a:solidFill>
                   <a:srgbClr val="000000"/>
                 </a:solidFill>
@@ -6676,14 +6676,14 @@
           </a:ln>
           <a:extLst>
             <a:ext uri="{909E8E84-426E-40dd-AFC4-6F175D3DCCD1}">
-              <a14:hiddenFill xmlns:a14="http://schemas.microsoft.com/office/drawing/2010/main" xmlns="">
+              <a14:hiddenFill xmlns="" xmlns:a14="http://schemas.microsoft.com/office/drawing/2010/main">
                 <a:solidFill>
                   <a:srgbClr val="FFFFFF"/>
                 </a:solidFill>
               </a14:hiddenFill>
             </a:ext>
             <a:ext uri="{91240B29-F687-4f45-9708-019B960494DF}">
-              <a14:hiddenLine xmlns:a14="http://schemas.microsoft.com/office/drawing/2010/main" xmlns="" w="9525">
+              <a14:hiddenLine xmlns="" xmlns:a14="http://schemas.microsoft.com/office/drawing/2010/main" w="9525">
                 <a:solidFill>
                   <a:srgbClr val="000000"/>
                 </a:solidFill>
@@ -9011,7 +9011,7 @@
                   <a:srgbClr val="0070C0"/>
                 </a:solidFill>
               </a:rPr>
-              <a:t>Figure 6. LSTM Structure</a:t>
+              <a:t>Figure 3. LSTM Structure</a:t>
             </a:r>
           </a:p>
         </p:txBody>
@@ -9181,7 +9181,7 @@
                   <a:srgbClr val="0070C0"/>
                 </a:solidFill>
               </a:rPr>
-              <a:t>Figure 7. Memory Cells</a:t>
+              <a:t>Figure 4. Memory Cells</a:t>
             </a:r>
           </a:p>
         </p:txBody>
@@ -10731,14 +10731,14 @@
           </a:ln>
           <a:extLst>
             <a:ext uri="{909E8E84-426E-40dd-AFC4-6F175D3DCCD1}">
-              <a14:hiddenFill xmlns:a14="http://schemas.microsoft.com/office/drawing/2010/main" xmlns="">
+              <a14:hiddenFill xmlns="" xmlns:a14="http://schemas.microsoft.com/office/drawing/2010/main">
                 <a:solidFill>
                   <a:srgbClr val="FFFFFF"/>
                 </a:solidFill>
               </a14:hiddenFill>
             </a:ext>
             <a:ext uri="{91240B29-F687-4f45-9708-019B960494DF}">
-              <a14:hiddenLine xmlns:a14="http://schemas.microsoft.com/office/drawing/2010/main" xmlns="" w="9525">
+              <a14:hiddenLine xmlns="" xmlns:a14="http://schemas.microsoft.com/office/drawing/2010/main" w="9525">
                 <a:solidFill>
                   <a:srgbClr val="000000"/>
                 </a:solidFill>
@@ -12279,7 +12279,7 @@
                   <a:srgbClr val="0070C0"/>
                 </a:solidFill>
               </a:rPr>
-              <a:t>Figure 5. Imputed Data</a:t>
+              <a:t>Figure 7. Imputed Data</a:t>
             </a:r>
           </a:p>
         </p:txBody>
@@ -12449,7 +12449,7 @@
                   <a:srgbClr val="0070C0"/>
                 </a:solidFill>
               </a:rPr>
-              <a:t>Figure 4. Missingness Present in P33</a:t>
+              <a:t>Figure 6. Missingness Present in P33</a:t>
             </a:r>
           </a:p>
         </p:txBody>
@@ -12652,14 +12652,14 @@
           </a:ln>
           <a:extLst>
             <a:ext uri="{909E8E84-426E-40dd-AFC4-6F175D3DCCD1}">
-              <a14:hiddenFill xmlns:a14="http://schemas.microsoft.com/office/drawing/2010/main" xmlns="">
+              <a14:hiddenFill xmlns="" xmlns:a14="http://schemas.microsoft.com/office/drawing/2010/main">
                 <a:solidFill>
                   <a:srgbClr val="FFFFFF"/>
                 </a:solidFill>
               </a14:hiddenFill>
             </a:ext>
             <a:ext uri="{91240B29-F687-4f45-9708-019B960494DF}">
-              <a14:hiddenLine xmlns:a14="http://schemas.microsoft.com/office/drawing/2010/main" xmlns="" w="9525">
+              <a14:hiddenLine xmlns="" xmlns:a14="http://schemas.microsoft.com/office/drawing/2010/main" w="9525">
                 <a:solidFill>
                   <a:srgbClr val="000000"/>
                 </a:solidFill>
@@ -13055,7 +13055,7 @@
                   <a:srgbClr val="0070C0"/>
                 </a:solidFill>
               </a:rPr>
-              <a:t>Figure 8. EVER Stations</a:t>
+              <a:t>Figure 5. EVER Stations</a:t>
             </a:r>
           </a:p>
         </p:txBody>
@@ -13583,7 +13583,7 @@
                   <a:srgbClr val="0070C0"/>
                 </a:solidFill>
               </a:rPr>
-              <a:t>Figure 3. Forecast Comparison</a:t>
+              <a:t>Figure 8. Forecast Comparison</a:t>
             </a:r>
           </a:p>
         </p:txBody>
@@ -14558,6 +14558,15 @@
 </file>
 
 <file path=customXml/item1.xml><?xml version="1.0" encoding="utf-8"?>
+<?mso-contentType ?>
+<FormTemplates xmlns="http://schemas.microsoft.com/sharepoint/v3/contenttype/forms">
+  <Display>DocumentLibraryForm</Display>
+  <Edit>DocumentLibraryForm</Edit>
+  <New>DocumentLibraryForm</New>
+</FormTemplates>
+</file>
+
+<file path=customXml/item2.xml><?xml version="1.0" encoding="utf-8"?>
 <ct:contentTypeSchema xmlns:ct="http://schemas.microsoft.com/office/2006/metadata/contentType" xmlns:ma="http://schemas.microsoft.com/office/2006/metadata/properties/metaAttributes" ct:_="" ma:_="" ma:contentTypeName="Document" ma:contentTypeID="0x010100DC58E895C404BE40B8E18D2FE0DE171E" ma:contentTypeVersion="15" ma:contentTypeDescription="Create a new document." ma:contentTypeScope="" ma:versionID="e3b50e3d3966c5dce05a9c59b7961e98">
   <xsd:schema xmlns:xsd="http://www.w3.org/2001/XMLSchema" xmlns:xs="http://www.w3.org/2001/XMLSchema" xmlns:p="http://schemas.microsoft.com/office/2006/metadata/properties" xmlns:ns2="d0d0097c-64f4-4e3b-99a3-bc1c796771ba" xmlns:ns3="a7e95da2-8946-49ae-a42c-eac0e2e49090" targetNamespace="http://schemas.microsoft.com/office/2006/metadata/properties" ma:root="true" ma:fieldsID="846743cf0710f7e7c5b0659fc053b820" ns2:_="" ns3:_="">
     <xsd:import namespace="d0d0097c-64f4-4e3b-99a3-bc1c796771ba"/>
@@ -14788,15 +14797,6 @@
 </ct:contentTypeSchema>
 </file>
 
-<file path=customXml/item2.xml><?xml version="1.0" encoding="utf-8"?>
-<?mso-contentType ?>
-<FormTemplates xmlns="http://schemas.microsoft.com/sharepoint/v3/contenttype/forms">
-  <Display>DocumentLibraryForm</Display>
-  <Edit>DocumentLibraryForm</Edit>
-  <New>DocumentLibraryForm</New>
-</FormTemplates>
-</file>
-
 <file path=customXml/item3.xml><?xml version="1.0" encoding="utf-8"?>
 <p:properties xmlns:p="http://schemas.microsoft.com/office/2006/metadata/properties" xmlns:xsi="http://www.w3.org/2001/XMLSchema-instance" xmlns:pc="http://schemas.microsoft.com/office/infopath/2007/PartnerControls">
   <documentManagement>
@@ -14809,6 +14809,14 @@
 </file>
 
 <file path=customXml/itemProps1.xml><?xml version="1.0" encoding="utf-8"?>
+<ds:datastoreItem xmlns:ds="http://schemas.openxmlformats.org/officeDocument/2006/customXml" ds:itemID="{E7CBD2F7-3565-4EC3-A19A-418CF48FD40C}">
+  <ds:schemaRefs>
+    <ds:schemaRef ds:uri="http://schemas.microsoft.com/sharepoint/v3/contenttype/forms"/>
+  </ds:schemaRefs>
+</ds:datastoreItem>
+</file>
+
+<file path=customXml/itemProps2.xml><?xml version="1.0" encoding="utf-8"?>
 <ds:datastoreItem xmlns:ds="http://schemas.openxmlformats.org/officeDocument/2006/customXml" ds:itemID="{E8B4DDAE-604A-4778-BDB0-C834633F1A3E}">
   <ds:schemaRefs>
     <ds:schemaRef ds:uri="http://schemas.microsoft.com/office/2006/metadata/contentType"/>
@@ -14827,14 +14835,6 @@
 </ds:datastoreItem>
 </file>
 
-<file path=customXml/itemProps2.xml><?xml version="1.0" encoding="utf-8"?>
-<ds:datastoreItem xmlns:ds="http://schemas.openxmlformats.org/officeDocument/2006/customXml" ds:itemID="{E7CBD2F7-3565-4EC3-A19A-418CF48FD40C}">
-  <ds:schemaRefs>
-    <ds:schemaRef ds:uri="http://schemas.microsoft.com/sharepoint/v3/contenttype/forms"/>
-  </ds:schemaRefs>
-</ds:datastoreItem>
-</file>
-
 <file path=customXml/itemProps3.xml><?xml version="1.0" encoding="utf-8"?>
 <ds:datastoreItem xmlns:ds="http://schemas.openxmlformats.org/officeDocument/2006/customXml" ds:itemID="{043E23B3-DF4A-4430-99EE-26D50DF888E5}">
   <ds:schemaRefs>

</xml_diff>